<commit_message>
david modify vcs code. @ sugar 1115
</commit_message>
<xml_diff>
--- a/_6.ims.tmp/使用SD卡燒錄程式.pptx
+++ b/_6.ims.tmp/使用SD卡燒錄程式.pptx
@@ -202,7 +202,7 @@
             <a:fld id="{9A58746A-7433-4E44-BB5D-246805387875}" type="datetimeFigureOut">
               <a:rPr lang="zh-TW" altLang="en-US" smtClean="0"/>
               <a:pPr/>
-              <a:t>2019/10/25</a:t>
+              <a:t>2019/10/29</a:t>
             </a:fld>
             <a:endParaRPr lang="zh-TW" altLang="en-US"/>
           </a:p>
@@ -540,7 +540,7 @@
                 </a:solidFill>
               </a:rPr>
               <a:pPr/>
-              <a:t>October 25, 2019</a:t>
+              <a:t>October 29, 2019</a:t>
             </a:fld>
             <a:endParaRPr lang="zh-TW" altLang="en-US" sz="3600" dirty="0">
               <a:solidFill>
@@ -928,7 +928,7 @@
                 </a:solidFill>
               </a:rPr>
               <a:pPr/>
-              <a:t>October 25, 2019</a:t>
+              <a:t>October 29, 2019</a:t>
             </a:fld>
             <a:endParaRPr lang="zh-TW" altLang="en-US" dirty="0">
               <a:solidFill>
@@ -3858,7 +3858,7 @@
         <p:spPr>
           <a:xfrm>
             <a:off x="357158" y="1299977"/>
-            <a:ext cx="6929486" cy="1200329"/>
+            <a:ext cx="6929486" cy="1477328"/>
           </a:xfrm>
           <a:prstGeom prst="rect">
             <a:avLst/>
@@ -3904,7 +3904,54 @@
                 <a:latin typeface="標楷體" pitchFamily="65" charset="-120"/>
                 <a:ea typeface="標楷體" pitchFamily="65" charset="-120"/>
               </a:rPr>
-              <a:t>，按踏板，看是否出現</a:t>
+              <a:t>，</a:t>
+            </a:r>
+            <a:endParaRPr lang="en-US" altLang="zh-TW" dirty="0" smtClean="0">
+              <a:latin typeface="標楷體" pitchFamily="65" charset="-120"/>
+              <a:ea typeface="標楷體" pitchFamily="65" charset="-120"/>
+            </a:endParaRPr>
+          </a:p>
+          <a:p>
+            <a:r>
+              <a:rPr lang="zh-TW" altLang="en-US" dirty="0" smtClean="0">
+                <a:latin typeface="標楷體" pitchFamily="65" charset="-120"/>
+                <a:ea typeface="標楷體" pitchFamily="65" charset="-120"/>
+              </a:rPr>
+              <a:t>按</a:t>
+            </a:r>
+            <a:r>
+              <a:rPr lang="en-US" altLang="zh-TW" dirty="0" smtClean="0">
+                <a:latin typeface="標楷體" pitchFamily="65" charset="-120"/>
+                <a:ea typeface="標楷體" pitchFamily="65" charset="-120"/>
+              </a:rPr>
+              <a:t>Reset</a:t>
+            </a:r>
+            <a:r>
+              <a:rPr lang="zh-TW" altLang="en-US" dirty="0" smtClean="0">
+                <a:latin typeface="標楷體" pitchFamily="65" charset="-120"/>
+                <a:ea typeface="標楷體" pitchFamily="65" charset="-120"/>
+              </a:rPr>
+              <a:t>，</a:t>
+            </a:r>
+            <a:endParaRPr lang="en-US" altLang="zh-TW" dirty="0" smtClean="0">
+              <a:latin typeface="標楷體" pitchFamily="65" charset="-120"/>
+              <a:ea typeface="標楷體" pitchFamily="65" charset="-120"/>
+            </a:endParaRPr>
+          </a:p>
+          <a:p>
+            <a:r>
+              <a:rPr lang="zh-TW" altLang="en-US" dirty="0" smtClean="0">
+                <a:latin typeface="標楷體" pitchFamily="65" charset="-120"/>
+                <a:ea typeface="標楷體" pitchFamily="65" charset="-120"/>
+              </a:rPr>
+              <a:t>按</a:t>
+            </a:r>
+            <a:r>
+              <a:rPr lang="zh-TW" altLang="en-US" dirty="0" smtClean="0">
+                <a:latin typeface="標楷體" pitchFamily="65" charset="-120"/>
+                <a:ea typeface="標楷體" pitchFamily="65" charset="-120"/>
+              </a:rPr>
+              <a:t>踏板，看是否出現</a:t>
             </a:r>
             <a:r>
               <a:rPr lang="en-US" altLang="zh-TW" dirty="0" smtClean="0">
@@ -3977,6 +4024,144 @@
           </a:prstGeom>
         </p:spPr>
       </p:pic>
+      <p:sp>
+        <p:nvSpPr>
+          <p:cNvPr id="5" name="橢圓 4"/>
+          <p:cNvSpPr/>
+          <p:nvPr/>
+        </p:nvSpPr>
+        <p:spPr>
+          <a:xfrm>
+            <a:off x="6429388" y="5072074"/>
+            <a:ext cx="642942" cy="602589"/>
+          </a:xfrm>
+          <a:prstGeom prst="ellipse">
+            <a:avLst/>
+          </a:prstGeom>
+          <a:noFill/>
+          <a:ln>
+            <a:solidFill>
+              <a:srgbClr val="FF0000"/>
+            </a:solidFill>
+          </a:ln>
+        </p:spPr>
+        <p:style>
+          <a:lnRef idx="2">
+            <a:schemeClr val="accent1">
+              <a:shade val="50000"/>
+            </a:schemeClr>
+          </a:lnRef>
+          <a:fillRef idx="1">
+            <a:schemeClr val="accent1"/>
+          </a:fillRef>
+          <a:effectRef idx="0">
+            <a:schemeClr val="accent1"/>
+          </a:effectRef>
+          <a:fontRef idx="minor">
+            <a:schemeClr val="lt1"/>
+          </a:fontRef>
+        </p:style>
+        <p:txBody>
+          <a:bodyPr rtlCol="0" anchor="ctr"/>
+          <a:lstStyle/>
+          <a:p>
+            <a:pPr algn="ctr"/>
+            <a:endParaRPr lang="zh-TW" altLang="en-US"/>
+          </a:p>
+        </p:txBody>
+      </p:sp>
+      <p:sp>
+        <p:nvSpPr>
+          <p:cNvPr id="8" name="橢圓 7"/>
+          <p:cNvSpPr/>
+          <p:nvPr/>
+        </p:nvSpPr>
+        <p:spPr>
+          <a:xfrm>
+            <a:off x="5000628" y="2928934"/>
+            <a:ext cx="642942" cy="602589"/>
+          </a:xfrm>
+          <a:prstGeom prst="ellipse">
+            <a:avLst/>
+          </a:prstGeom>
+          <a:noFill/>
+          <a:ln>
+            <a:solidFill>
+              <a:srgbClr val="FF0000"/>
+            </a:solidFill>
+          </a:ln>
+        </p:spPr>
+        <p:style>
+          <a:lnRef idx="2">
+            <a:schemeClr val="accent1">
+              <a:shade val="50000"/>
+            </a:schemeClr>
+          </a:lnRef>
+          <a:fillRef idx="1">
+            <a:schemeClr val="accent1"/>
+          </a:fillRef>
+          <a:effectRef idx="0">
+            <a:schemeClr val="accent1"/>
+          </a:effectRef>
+          <a:fontRef idx="minor">
+            <a:schemeClr val="lt1"/>
+          </a:fontRef>
+        </p:style>
+        <p:txBody>
+          <a:bodyPr rtlCol="0" anchor="ctr"/>
+          <a:lstStyle/>
+          <a:p>
+            <a:pPr algn="ctr"/>
+            <a:endParaRPr lang="zh-TW" altLang="en-US"/>
+          </a:p>
+        </p:txBody>
+      </p:sp>
+      <p:sp>
+        <p:nvSpPr>
+          <p:cNvPr id="9" name="橢圓 8"/>
+          <p:cNvSpPr/>
+          <p:nvPr/>
+        </p:nvSpPr>
+        <p:spPr>
+          <a:xfrm>
+            <a:off x="1142976" y="4429132"/>
+            <a:ext cx="642942" cy="602589"/>
+          </a:xfrm>
+          <a:prstGeom prst="ellipse">
+            <a:avLst/>
+          </a:prstGeom>
+          <a:noFill/>
+          <a:ln>
+            <a:solidFill>
+              <a:srgbClr val="FF0000"/>
+            </a:solidFill>
+          </a:ln>
+        </p:spPr>
+        <p:style>
+          <a:lnRef idx="2">
+            <a:schemeClr val="accent1">
+              <a:shade val="50000"/>
+            </a:schemeClr>
+          </a:lnRef>
+          <a:fillRef idx="1">
+            <a:schemeClr val="accent1"/>
+          </a:fillRef>
+          <a:effectRef idx="0">
+            <a:schemeClr val="accent1"/>
+          </a:effectRef>
+          <a:fontRef idx="minor">
+            <a:schemeClr val="lt1"/>
+          </a:fontRef>
+        </p:style>
+        <p:txBody>
+          <a:bodyPr rtlCol="0" anchor="ctr"/>
+          <a:lstStyle/>
+          <a:p>
+            <a:pPr algn="ctr"/>
+            <a:endParaRPr lang="zh-TW" altLang="en-US"/>
+          </a:p>
+        </p:txBody>
+      </p:sp>
     </p:spTree>
   </p:cSld>
   <p:clrMapOvr>
@@ -4157,10 +4342,6 @@
               </a:rPr>
               <a:t>Save</a:t>
             </a:r>
-            <a:endParaRPr lang="en-US" altLang="zh-TW" dirty="0" smtClean="0">
-              <a:latin typeface="標楷體" pitchFamily="65" charset="-120"/>
-              <a:ea typeface="標楷體" pitchFamily="65" charset="-120"/>
-            </a:endParaRPr>
           </a:p>
           <a:p>
             <a:endParaRPr lang="en-US" altLang="zh-TW" dirty="0" smtClean="0">

</xml_diff>